<commit_message>
Change the layout of the Slides
I change how some the slides looked and added a little more information to one.
</commit_message>
<xml_diff>
--- a/Phase 4 Documentation/Team_2_Presentation_4_(Jacob's).pptx
+++ b/Phase 4 Documentation/Team_2_Presentation_4_(Jacob's).pptx
@@ -9880,7 +9880,7 @@
           <a:lstStyle/>
           <a:p>
             <a:r>
-              <a:rPr lang="en-US">
+              <a:rPr lang="en-US" dirty="0">
                 <a:gradFill flip="none" rotWithShape="1">
                   <a:gsLst>
                     <a:gs pos="0">
@@ -9901,7 +9901,7 @@
           </a:p>
           <a:p>
             <a:r>
-              <a:rPr lang="en-US">
+              <a:rPr lang="en-US" dirty="0">
                 <a:gradFill flip="none" rotWithShape="1">
                   <a:gsLst>
                     <a:gs pos="0">
@@ -9922,7 +9922,7 @@
           </a:p>
           <a:p>
             <a:r>
-              <a:rPr lang="en-US">
+              <a:rPr lang="en-US" dirty="0">
                 <a:gradFill flip="none" rotWithShape="1">
                   <a:gsLst>
                     <a:gs pos="0">
@@ -10856,28 +10856,28 @@
           <a:lstStyle/>
           <a:p>
             <a:r>
-              <a:rPr lang="en-US"/>
+              <a:rPr lang="en-US" dirty="0"/>
               <a:t>Other apps -</a:t>
             </a:r>
           </a:p>
           <a:p>
             <a:pPr lvl="1"/>
             <a:r>
-              <a:rPr lang="en-US"/>
+              <a:rPr lang="en-US" dirty="0"/>
               <a:t>Lack of security</a:t>
             </a:r>
           </a:p>
           <a:p>
             <a:pPr lvl="1"/>
             <a:r>
-              <a:rPr lang="en-US"/>
+              <a:rPr lang="en-US" dirty="0"/>
               <a:t>Poor organization</a:t>
             </a:r>
           </a:p>
           <a:p>
             <a:pPr lvl="1"/>
             <a:r>
-              <a:rPr lang="en-US"/>
+              <a:rPr lang="en-US" dirty="0"/>
               <a:t>No automatic categorization</a:t>
             </a:r>
           </a:p>

</xml_diff>